<commit_message>
Add completed Nonclinical interface with comprehensive Step 1 content - Updated PowerPoint presentation and added backup file - Nonclinical interface includes TIG Section 3.2 tracker, 5-Step Lifecycle with purple theme, SEND domains, In Vitro/In Vivo studies, and discovery metrics
</commit_message>
<xml_diff>
--- a/Life Sciences Data Governance Strategy.pptx
+++ b/Life Sciences Data Governance Strategy.pptx
@@ -122,14 +122,6 @@
 </p:presentation>
 </file>
 
-<file path=ppt/revisionInfo.xml><?xml version="1.0" encoding="utf-8"?>
-<p1510:revInfo xmlns:a="http://schemas.openxmlformats.org/drawingml/2006/main" xmlns:r="http://schemas.openxmlformats.org/officeDocument/2006/relationships" xmlns:p1510="http://schemas.microsoft.com/office/powerpoint/2015/10/main">
-  <p1510:revLst>
-    <p1510:client id="{0286B533-FD33-4149-8C67-F6E5438D68B2}" v="61" dt="2025-06-03T09:11:54.833"/>
-  </p1510:revLst>
-</p1510:revInfo>
-</file>
-
 <file path=ppt/notesMasters/notesMaster1.xml><?xml version="1.0" encoding="utf-8"?>
 <p:notesMaster xmlns:a="http://schemas.openxmlformats.org/drawingml/2006/main" xmlns:r="http://schemas.openxmlformats.org/officeDocument/2006/relationships" xmlns:p="http://schemas.openxmlformats.org/presentationml/2006/main">
   <p:cSld>
@@ -814,17 +806,7 @@
           <a:bodyPr/>
           <a:lstStyle/>
           <a:p>
-            <a:r>
-              <a:rPr lang="en-US"/>
-              <a:t>Strategic value opportunities include enhanced decision-making with trusted data, regulatory compliance, accelerated innovation with reusable data assets, and increased operational efficiency in life sciences.
-Original Content:
-Strategic Value Opportunity
-Enhanced decision-making through trusted, accessible data
-Regulatory compliance and reduced risk exposure
-Accelerated innovation through reliable, reusable data assets
-Increased operational efficiency across life sciences functions
-</a:t>
-            </a:r>
+            <a:endParaRPr lang="en-US" dirty="0"/>
           </a:p>
         </p:txBody>
       </p:sp>
@@ -908,19 +890,7 @@
           <a:bodyPr/>
           <a:lstStyle/>
           <a:p>
-            <a:r>
-              <a:rPr lang="en-US"/>
-              <a:t>Our governance strategy includes a unified data quality framework, comprehensive metadata architecture, risk and value-based approach, formal data stewardship model, GxP compliance framework, and end-to-end data lifecycle management.
-Original Content:
-WHAT: Governance Strategy &amp; Framework (3 minutes)
-Key Governance Framework Elements
-Unified data quality framework across sub-functions
-Comprehensive metadata architecture (business glossary, repository, data models)
-Risk and Value-Based approach aligned with ICH Q9 principles
-Formal data stewardship model with clear accountability
-GxP compliance framework with CDISC standards implementation End-to-end data lifecycle management
-</a:t>
-            </a:r>
+            <a:endParaRPr lang="en-US" dirty="0"/>
           </a:p>
         </p:txBody>
       </p:sp>
@@ -1004,16 +974,7 @@
           <a:bodyPr/>
           <a:lstStyle/>
           <a:p>
-            <a:r>
-              <a:rPr lang="en-US"/>
-              <a:t>This slide covers key aspects of clinical and pre-clinical trials, including data integrity, quality, and standardization. It also highlights regulatory requirements and the importance of real-world evidence.
-Original Content:
-Clinical Trials: Protocol data integrity, site data quality, eCRF standardization, submission readiness
-Pre-clinical: Experimental reproducibility, method standardization, sample traceability
-Regulatory: Submission accuracy, global consistency, change control, document versioning
-Real-World Evidence: Data source credibility, bias control, analytical reproducibility
-</a:t>
-            </a:r>
+            <a:endParaRPr lang="en-US" dirty="0"/>
           </a:p>
         </p:txBody>
       </p:sp>
@@ -1097,23 +1058,7 @@
           <a:bodyPr/>
           <a:lstStyle/>
           <a:p>
-            <a:r>
-              <a:rPr lang="en-US"/>
-              <a:t>In conclusion, executive sponsorship is crucial. Start with a business glossary and focus on high-value use cases. Balance standardization with specific needs. The risk and value-based approach aligns with regulatory expectations, allocates resources efficiently, provides continuous monitoring, and demonstrates business value.
-Original Content:
-LESSONS LEARNED &amp; CONCLUSION (1 minute)
-Critical Success Factors
-Executive sponsorship is non-negotiable
-Start with business glossary to establish common language
-Begin with high-value, high-visibility use cases
-Balance standardization with function-specific needs
-Risk and Value-Based Approach Benefits
-Aligns with regulatory expectations (FDA, EMA) and ICH Q9 principles
-Enables efficient resource allocation to highest-risk and highest-value data assets
-Provides framework for continuous monitoring and improvement
-Demonstrates tangible business value while ensuring regulatory compliance
-</a:t>
-            </a:r>
+            <a:endParaRPr lang="en-US" dirty="0"/>
           </a:p>
         </p:txBody>
       </p:sp>
@@ -5800,7 +5745,7 @@
         </p:nvSpPr>
         <p:spPr>
           <a:xfrm>
-            <a:off x="5574433" y="2093976"/>
+            <a:off x="612469" y="2093976"/>
             <a:ext cx="6096359" cy="4050792"/>
           </a:xfrm>
         </p:spPr>
@@ -6080,8 +6025,8 @@
         </p:nvGrpSpPr>
         <p:grpSpPr>
           <a:xfrm>
-            <a:off x="1180215" y="2436632"/>
-            <a:ext cx="10915445" cy="4014751"/>
+            <a:off x="376519" y="2436632"/>
+            <a:ext cx="11719142" cy="4014751"/>
             <a:chOff x="2379945" y="1865719"/>
             <a:chExt cx="9726210" cy="4566698"/>
           </a:xfrm>
@@ -6175,8 +6120,8 @@
           </p:nvSpPr>
           <p:spPr>
             <a:xfrm>
-              <a:off x="5525360" y="2486186"/>
-              <a:ext cx="6580795" cy="3946231"/>
+              <a:off x="5861952" y="2486186"/>
+              <a:ext cx="6244203" cy="3946231"/>
             </a:xfrm>
             <a:prstGeom prst="rect">
               <a:avLst/>
@@ -6511,7 +6456,15 @@
           <a:p>
             <a:r>
               <a:rPr lang="en-US" dirty="0"/>
-              <a:t>Transform data from a compliance burden into a strategic asset that drives business performance across all Life Sciences sub-functions.</a:t>
+              <a:t>Transform data from </a:t>
+            </a:r>
+            <a:r>
+              <a:rPr lang="en-US" b="1" u="sng" dirty="0"/>
+              <a:t>a compliance burden into a strategic asset </a:t>
+            </a:r>
+            <a:r>
+              <a:rPr lang="en-US" dirty="0"/>
+              <a:t>that drives business performance across all Life Sciences sub-functions.</a:t>
             </a:r>
           </a:p>
         </p:txBody>
@@ -6532,8 +6485,8 @@
         </p:nvSpPr>
         <p:spPr>
           <a:xfrm>
-            <a:off x="1077118" y="3158852"/>
-            <a:ext cx="3633106" cy="3119707"/>
+            <a:off x="450636" y="3180258"/>
+            <a:ext cx="3900609" cy="3119707"/>
           </a:xfrm>
           <a:prstGeom prst="rect">
             <a:avLst/>
@@ -6709,27 +6662,51 @@
           </a:lstStyle>
           <a:p>
             <a:r>
-              <a:rPr lang="en-US" sz="1600" b="1" dirty="0">
-                <a:solidFill>
-                  <a:schemeClr val="accent3"/>
-                </a:solidFill>
-              </a:rPr>
-              <a:t>Enhance decision making through trusted and accessible data</a:t>
-            </a:r>
-          </a:p>
-          <a:p>
-            <a:r>
-              <a:rPr lang="en-US" sz="1600" b="1" dirty="0">
-                <a:solidFill>
-                  <a:schemeClr val="accent3"/>
-                </a:solidFill>
-              </a:rPr>
-              <a:t>Regulatory compliance and reduced exposure </a:t>
-            </a:r>
-          </a:p>
-          <a:p>
-            <a:r>
-              <a:rPr lang="en-US" sz="1600" b="1" dirty="0">
+              <a:rPr lang="en-US" sz="1600" dirty="0"/>
+              <a:t>Enhance </a:t>
+            </a:r>
+            <a:r>
+              <a:rPr lang="en-US" sz="1600" b="1" dirty="0"/>
+              <a:t>decision making </a:t>
+            </a:r>
+            <a:r>
+              <a:rPr lang="en-US" sz="1600" dirty="0"/>
+              <a:t>through trusted and accessible data</a:t>
+            </a:r>
+          </a:p>
+          <a:p>
+            <a:r>
+              <a:rPr lang="en-US" sz="1600" b="1" dirty="0"/>
+              <a:t>Regulatory compliance </a:t>
+            </a:r>
+            <a:r>
+              <a:rPr lang="en-US" sz="1600" dirty="0"/>
+              <a:t>and reduced exposure </a:t>
+            </a:r>
+          </a:p>
+          <a:p>
+            <a:r>
+              <a:rPr lang="en-US" sz="1600" b="1" dirty="0"/>
+              <a:t>Accelerate innovation </a:t>
+            </a:r>
+            <a:r>
+              <a:rPr lang="en-US" sz="1600" dirty="0"/>
+              <a:t>through reusable data assets</a:t>
+            </a:r>
+          </a:p>
+          <a:p>
+            <a:r>
+              <a:rPr lang="en-US" sz="1600" b="1" dirty="0"/>
+              <a:t>Increase operational efficiency </a:t>
+            </a:r>
+            <a:r>
+              <a:rPr lang="en-US" sz="1600" dirty="0"/>
+              <a:t>across subfunctions</a:t>
+            </a:r>
+          </a:p>
+          <a:p>
+            <a:r>
+              <a:rPr lang="en-US" sz="1600" dirty="0">
                 <a:solidFill>
                   <a:schemeClr val="accent3"/>
                 </a:solidFill>
@@ -6738,24 +6715,6 @@
             </a:r>
           </a:p>
           <a:p>
-            <a:r>
-              <a:rPr lang="en-US" sz="1600" b="1" dirty="0">
-                <a:solidFill>
-                  <a:schemeClr val="accent3"/>
-                </a:solidFill>
-              </a:rPr>
-              <a:t>Accelerate innovation through reusable data assets</a:t>
-            </a:r>
-          </a:p>
-          <a:p>
-            <a:r>
-              <a:rPr lang="en-US" sz="1600" b="1" dirty="0">
-                <a:solidFill>
-                  <a:schemeClr val="accent3"/>
-                </a:solidFill>
-              </a:rPr>
-              <a:t>Increase operational efficiency across subfunctions</a:t>
-            </a:r>
             <a:endParaRPr lang="en-US" sz="1600" dirty="0"/>
           </a:p>
         </p:txBody>
@@ -7166,261 +7125,237 @@
           </a:p>
         </p:txBody>
       </p:sp>
-      <p:sp>
-        <p:nvSpPr>
-          <p:cNvPr id="5" name="Rectangle 4">
-            <a:extLst>
-              <a:ext uri="{FF2B5EF4-FFF2-40B4-BE49-F238E27FC236}">
-                <a16:creationId xmlns:a16="http://schemas.microsoft.com/office/drawing/2014/main" id="{F2D3D74B-FF7E-7601-7706-DC98E8CBE45D}"/>
-              </a:ext>
-            </a:extLst>
-          </p:cNvPr>
-          <p:cNvSpPr/>
+      <p:grpSp>
+        <p:nvGrpSpPr>
+          <p:cNvPr id="3" name="Group 2">
+            <a:extLst>
+              <a:ext uri="{FF2B5EF4-FFF2-40B4-BE49-F238E27FC236}">
+                <a16:creationId xmlns:a16="http://schemas.microsoft.com/office/drawing/2014/main" id="{0A1455F7-3BDF-0A72-CBF1-DAFA2DCAFAA6}"/>
+              </a:ext>
+            </a:extLst>
+          </p:cNvPr>
+          <p:cNvGrpSpPr/>
           <p:nvPr/>
-        </p:nvSpPr>
-        <p:spPr>
+        </p:nvGrpSpPr>
+        <p:grpSpPr>
           <a:xfrm>
-            <a:off x="5066160" y="2764599"/>
-            <a:ext cx="6589337" cy="731520"/>
+            <a:off x="5053914" y="1881710"/>
+            <a:ext cx="6613829" cy="4364639"/>
+            <a:chOff x="5053914" y="1881711"/>
+            <a:chExt cx="6613829" cy="3295730"/>
           </a:xfrm>
-          <a:prstGeom prst="rect">
-            <a:avLst/>
-          </a:prstGeom>
-          <a:solidFill>
-            <a:schemeClr val="tx2"/>
-          </a:solidFill>
-        </p:spPr>
-        <p:style>
-          <a:lnRef idx="2">
-            <a:schemeClr val="accent1">
-              <a:shade val="15000"/>
-            </a:schemeClr>
-          </a:lnRef>
-          <a:fillRef idx="1">
-            <a:schemeClr val="accent1"/>
-          </a:fillRef>
-          <a:effectRef idx="0">
-            <a:schemeClr val="accent1"/>
-          </a:effectRef>
-          <a:fontRef idx="minor">
-            <a:schemeClr val="lt1"/>
-          </a:fontRef>
-        </p:style>
-        <p:txBody>
-          <a:bodyPr rtlCol="0" anchor="ctr"/>
-          <a:lstStyle/>
-          <a:p>
-            <a:r>
-              <a:rPr lang="en-US" sz="1600" dirty="0"/>
-              <a:t>Centralized metadata (aka data catalogue)</a:t>
-            </a:r>
-          </a:p>
-        </p:txBody>
-      </p:sp>
-      <p:sp>
-        <p:nvSpPr>
-          <p:cNvPr id="6" name="Rectangle 5">
-            <a:extLst>
-              <a:ext uri="{FF2B5EF4-FFF2-40B4-BE49-F238E27FC236}">
-                <a16:creationId xmlns:a16="http://schemas.microsoft.com/office/drawing/2014/main" id="{209A4FF4-E08B-5492-D957-9F9EB2A8667B}"/>
-              </a:ext>
-            </a:extLst>
-          </p:cNvPr>
-          <p:cNvSpPr/>
-          <p:nvPr/>
-        </p:nvSpPr>
-        <p:spPr>
-          <a:xfrm>
-            <a:off x="5053914" y="4445921"/>
-            <a:ext cx="6589337" cy="731520"/>
-          </a:xfrm>
-          <a:prstGeom prst="rect">
-            <a:avLst/>
-          </a:prstGeom>
-          <a:solidFill>
-            <a:schemeClr val="tx2"/>
-          </a:solidFill>
-        </p:spPr>
-        <p:style>
-          <a:lnRef idx="2">
-            <a:schemeClr val="accent1">
-              <a:shade val="15000"/>
-            </a:schemeClr>
-          </a:lnRef>
-          <a:fillRef idx="1">
-            <a:schemeClr val="accent1"/>
-          </a:fillRef>
-          <a:effectRef idx="0">
-            <a:schemeClr val="accent1"/>
-          </a:effectRef>
-          <a:fontRef idx="minor">
-            <a:schemeClr val="lt1"/>
-          </a:fontRef>
-        </p:style>
-        <p:txBody>
-          <a:bodyPr rtlCol="0" anchor="ctr"/>
-          <a:lstStyle/>
-          <a:p>
-            <a:r>
-              <a:rPr lang="en-US" sz="1600" dirty="0"/>
-              <a:t>AI-powered 5 step lifecycle management </a:t>
-            </a:r>
-          </a:p>
-        </p:txBody>
-      </p:sp>
-      <p:sp>
-        <p:nvSpPr>
-          <p:cNvPr id="7" name="Rectangle 6">
-            <a:extLst>
-              <a:ext uri="{FF2B5EF4-FFF2-40B4-BE49-F238E27FC236}">
-                <a16:creationId xmlns:a16="http://schemas.microsoft.com/office/drawing/2014/main" id="{1B3D3BA7-3F32-6B3D-8748-275B010FA219}"/>
-              </a:ext>
-            </a:extLst>
-          </p:cNvPr>
-          <p:cNvSpPr/>
-          <p:nvPr/>
-        </p:nvSpPr>
-        <p:spPr>
-          <a:xfrm>
-            <a:off x="5066160" y="3605260"/>
-            <a:ext cx="6589336" cy="731520"/>
-          </a:xfrm>
-          <a:prstGeom prst="rect">
-            <a:avLst/>
-          </a:prstGeom>
-          <a:solidFill>
-            <a:schemeClr val="tx2"/>
-          </a:solidFill>
-        </p:spPr>
-        <p:style>
-          <a:lnRef idx="2">
-            <a:schemeClr val="accent1">
-              <a:shade val="15000"/>
-            </a:schemeClr>
-          </a:lnRef>
-          <a:fillRef idx="1">
-            <a:schemeClr val="accent1"/>
-          </a:fillRef>
-          <a:effectRef idx="0">
-            <a:schemeClr val="accent1"/>
-          </a:effectRef>
-          <a:fontRef idx="minor">
-            <a:schemeClr val="lt1"/>
-          </a:fontRef>
-        </p:style>
-        <p:txBody>
-          <a:bodyPr rtlCol="0" anchor="ctr"/>
-          <a:lstStyle/>
-          <a:p>
-            <a:r>
-              <a:rPr lang="en-US" sz="1600" dirty="0"/>
-              <a:t>Data Stewardship Model (clear R&amp;R enabled by AI assistant)</a:t>
-            </a:r>
-          </a:p>
-        </p:txBody>
-      </p:sp>
-      <p:sp>
-        <p:nvSpPr>
-          <p:cNvPr id="9" name="Rectangle 8">
-            <a:extLst>
-              <a:ext uri="{FF2B5EF4-FFF2-40B4-BE49-F238E27FC236}">
-                <a16:creationId xmlns:a16="http://schemas.microsoft.com/office/drawing/2014/main" id="{D56F27BD-52EF-C51B-1AAE-826CB7BB8866}"/>
-              </a:ext>
-            </a:extLst>
-          </p:cNvPr>
-          <p:cNvSpPr/>
-          <p:nvPr/>
-        </p:nvSpPr>
-        <p:spPr>
-          <a:xfrm>
-            <a:off x="5078406" y="1881711"/>
-            <a:ext cx="6589337" cy="731520"/>
-          </a:xfrm>
-          <a:prstGeom prst="rect">
-            <a:avLst/>
-          </a:prstGeom>
-          <a:solidFill>
-            <a:schemeClr val="tx2"/>
-          </a:solidFill>
-        </p:spPr>
-        <p:style>
-          <a:lnRef idx="2">
-            <a:schemeClr val="accent1">
-              <a:shade val="15000"/>
-            </a:schemeClr>
-          </a:lnRef>
-          <a:fillRef idx="1">
-            <a:schemeClr val="accent1"/>
-          </a:fillRef>
-          <a:effectRef idx="0">
-            <a:schemeClr val="accent1"/>
-          </a:effectRef>
-          <a:fontRef idx="minor">
-            <a:schemeClr val="lt1"/>
-          </a:fontRef>
-        </p:style>
-        <p:txBody>
-          <a:bodyPr rtlCol="0" anchor="ctr"/>
-          <a:lstStyle/>
-          <a:p>
-            <a:r>
-              <a:rPr lang="en-US" sz="1600" dirty="0"/>
-              <a:t>Value driven &amp; compliance</a:t>
-            </a:r>
-          </a:p>
-        </p:txBody>
-      </p:sp>
-      <p:sp>
-        <p:nvSpPr>
-          <p:cNvPr id="11" name="Rectangle 10">
-            <a:extLst>
-              <a:ext uri="{FF2B5EF4-FFF2-40B4-BE49-F238E27FC236}">
-                <a16:creationId xmlns:a16="http://schemas.microsoft.com/office/drawing/2014/main" id="{8CA9C5C1-C0C6-6C25-3E37-FF383E419F7A}"/>
-              </a:ext>
-            </a:extLst>
-          </p:cNvPr>
-          <p:cNvSpPr/>
-          <p:nvPr/>
-        </p:nvSpPr>
-        <p:spPr>
-          <a:xfrm>
-            <a:off x="5053913" y="5326999"/>
-            <a:ext cx="6589337" cy="731520"/>
-          </a:xfrm>
-          <a:prstGeom prst="rect">
-            <a:avLst/>
-          </a:prstGeom>
-          <a:solidFill>
-            <a:schemeClr val="tx2"/>
-          </a:solidFill>
-        </p:spPr>
-        <p:style>
-          <a:lnRef idx="2">
-            <a:schemeClr val="accent1">
-              <a:shade val="15000"/>
-            </a:schemeClr>
-          </a:lnRef>
-          <a:fillRef idx="1">
-            <a:schemeClr val="accent1"/>
-          </a:fillRef>
-          <a:effectRef idx="0">
-            <a:schemeClr val="accent1"/>
-          </a:effectRef>
-          <a:fontRef idx="minor">
-            <a:schemeClr val="lt1"/>
-          </a:fontRef>
-        </p:style>
-        <p:txBody>
-          <a:bodyPr rtlCol="0" anchor="ctr"/>
-          <a:lstStyle/>
-          <a:p>
-            <a:r>
-              <a:rPr lang="en-US" sz="1600" dirty="0"/>
-              <a:t>Operationalized FAIR principles</a:t>
-            </a:r>
-          </a:p>
-        </p:txBody>
-      </p:sp>
+        </p:grpSpPr>
+        <p:sp>
+          <p:nvSpPr>
+            <p:cNvPr id="5" name="Rectangle 4">
+              <a:extLst>
+                <a:ext uri="{FF2B5EF4-FFF2-40B4-BE49-F238E27FC236}">
+                  <a16:creationId xmlns:a16="http://schemas.microsoft.com/office/drawing/2014/main" id="{F2D3D74B-FF7E-7601-7706-DC98E8CBE45D}"/>
+                </a:ext>
+              </a:extLst>
+            </p:cNvPr>
+            <p:cNvSpPr/>
+            <p:nvPr/>
+          </p:nvSpPr>
+          <p:spPr>
+            <a:xfrm>
+              <a:off x="5066160" y="2736448"/>
+              <a:ext cx="6589337" cy="731520"/>
+            </a:xfrm>
+            <a:prstGeom prst="rect">
+              <a:avLst/>
+            </a:prstGeom>
+            <a:solidFill>
+              <a:schemeClr val="tx2"/>
+            </a:solidFill>
+          </p:spPr>
+          <p:style>
+            <a:lnRef idx="2">
+              <a:schemeClr val="accent1">
+                <a:shade val="15000"/>
+              </a:schemeClr>
+            </a:lnRef>
+            <a:fillRef idx="1">
+              <a:schemeClr val="accent1"/>
+            </a:fillRef>
+            <a:effectRef idx="0">
+              <a:schemeClr val="accent1"/>
+            </a:effectRef>
+            <a:fontRef idx="minor">
+              <a:schemeClr val="lt1"/>
+            </a:fontRef>
+          </p:style>
+          <p:txBody>
+            <a:bodyPr rtlCol="0" anchor="ctr"/>
+            <a:lstStyle/>
+            <a:p>
+              <a:r>
+                <a:rPr lang="en-US" dirty="0"/>
+                <a:t>Centralized metadata (aka data catalogue) (accelerated by AI)</a:t>
+              </a:r>
+            </a:p>
+          </p:txBody>
+        </p:sp>
+        <p:sp>
+          <p:nvSpPr>
+            <p:cNvPr id="6" name="Rectangle 5">
+              <a:extLst>
+                <a:ext uri="{FF2B5EF4-FFF2-40B4-BE49-F238E27FC236}">
+                  <a16:creationId xmlns:a16="http://schemas.microsoft.com/office/drawing/2014/main" id="{209A4FF4-E08B-5492-D957-9F9EB2A8667B}"/>
+                </a:ext>
+              </a:extLst>
+            </p:cNvPr>
+            <p:cNvSpPr/>
+            <p:nvPr/>
+          </p:nvSpPr>
+          <p:spPr>
+            <a:xfrm>
+              <a:off x="5053914" y="4445921"/>
+              <a:ext cx="6589337" cy="731520"/>
+            </a:xfrm>
+            <a:prstGeom prst="rect">
+              <a:avLst/>
+            </a:prstGeom>
+            <a:solidFill>
+              <a:schemeClr val="tx2"/>
+            </a:solidFill>
+          </p:spPr>
+          <p:style>
+            <a:lnRef idx="2">
+              <a:schemeClr val="accent1">
+                <a:shade val="15000"/>
+              </a:schemeClr>
+            </a:lnRef>
+            <a:fillRef idx="1">
+              <a:schemeClr val="accent1"/>
+            </a:fillRef>
+            <a:effectRef idx="0">
+              <a:schemeClr val="accent1"/>
+            </a:effectRef>
+            <a:fontRef idx="minor">
+              <a:schemeClr val="lt1"/>
+            </a:fontRef>
+          </p:style>
+          <p:txBody>
+            <a:bodyPr rtlCol="0" anchor="ctr"/>
+            <a:lstStyle/>
+            <a:p>
+              <a:r>
+                <a:rPr lang="en-US" dirty="0"/>
+                <a:t>Operationalize FAIR through 5 step lifecycle management</a:t>
+              </a:r>
+            </a:p>
+            <a:p>
+              <a:r>
+                <a:rPr lang="en-US" sz="1400" dirty="0"/>
+                <a:t>Discover (F) – Define (R) – Standardize (I) – Protect(A) – Govern &amp; Optimize</a:t>
+              </a:r>
+            </a:p>
+          </p:txBody>
+        </p:sp>
+        <p:sp>
+          <p:nvSpPr>
+            <p:cNvPr id="7" name="Rectangle 6">
+              <a:extLst>
+                <a:ext uri="{FF2B5EF4-FFF2-40B4-BE49-F238E27FC236}">
+                  <a16:creationId xmlns:a16="http://schemas.microsoft.com/office/drawing/2014/main" id="{1B3D3BA7-3F32-6B3D-8748-275B010FA219}"/>
+                </a:ext>
+              </a:extLst>
+            </p:cNvPr>
+            <p:cNvSpPr/>
+            <p:nvPr/>
+          </p:nvSpPr>
+          <p:spPr>
+            <a:xfrm>
+              <a:off x="5066160" y="3591185"/>
+              <a:ext cx="6589336" cy="731520"/>
+            </a:xfrm>
+            <a:prstGeom prst="rect">
+              <a:avLst/>
+            </a:prstGeom>
+            <a:solidFill>
+              <a:schemeClr val="tx2"/>
+            </a:solidFill>
+          </p:spPr>
+          <p:style>
+            <a:lnRef idx="2">
+              <a:schemeClr val="accent1">
+                <a:shade val="15000"/>
+              </a:schemeClr>
+            </a:lnRef>
+            <a:fillRef idx="1">
+              <a:schemeClr val="accent1"/>
+            </a:fillRef>
+            <a:effectRef idx="0">
+              <a:schemeClr val="accent1"/>
+            </a:effectRef>
+            <a:fontRef idx="minor">
+              <a:schemeClr val="lt1"/>
+            </a:fontRef>
+          </p:style>
+          <p:txBody>
+            <a:bodyPr rtlCol="0" anchor="ctr"/>
+            <a:lstStyle/>
+            <a:p>
+              <a:r>
+                <a:rPr lang="en-US" dirty="0"/>
+                <a:t>Data Stewardship Model (clear R&amp;R enabled by AI assistant)</a:t>
+              </a:r>
+            </a:p>
+          </p:txBody>
+        </p:sp>
+        <p:sp>
+          <p:nvSpPr>
+            <p:cNvPr id="9" name="Rectangle 8">
+              <a:extLst>
+                <a:ext uri="{FF2B5EF4-FFF2-40B4-BE49-F238E27FC236}">
+                  <a16:creationId xmlns:a16="http://schemas.microsoft.com/office/drawing/2014/main" id="{D56F27BD-52EF-C51B-1AAE-826CB7BB8866}"/>
+                </a:ext>
+              </a:extLst>
+            </p:cNvPr>
+            <p:cNvSpPr/>
+            <p:nvPr/>
+          </p:nvSpPr>
+          <p:spPr>
+            <a:xfrm>
+              <a:off x="5078406" y="1881711"/>
+              <a:ext cx="6589337" cy="731520"/>
+            </a:xfrm>
+            <a:prstGeom prst="rect">
+              <a:avLst/>
+            </a:prstGeom>
+            <a:solidFill>
+              <a:schemeClr val="tx2"/>
+            </a:solidFill>
+          </p:spPr>
+          <p:style>
+            <a:lnRef idx="2">
+              <a:schemeClr val="accent1">
+                <a:shade val="15000"/>
+              </a:schemeClr>
+            </a:lnRef>
+            <a:fillRef idx="1">
+              <a:schemeClr val="accent1"/>
+            </a:fillRef>
+            <a:effectRef idx="0">
+              <a:schemeClr val="accent1"/>
+            </a:effectRef>
+            <a:fontRef idx="minor">
+              <a:schemeClr val="lt1"/>
+            </a:fontRef>
+          </p:style>
+          <p:txBody>
+            <a:bodyPr rtlCol="0" anchor="ctr"/>
+            <a:lstStyle/>
+            <a:p>
+              <a:r>
+                <a:rPr lang="en-US" dirty="0"/>
+                <a:t>Value driven &amp; compliance</a:t>
+              </a:r>
+            </a:p>
+          </p:txBody>
+        </p:sp>
+      </p:grpSp>
       <p:sp>
         <p:nvSpPr>
           <p:cNvPr id="13" name="TextBox 12">
@@ -8142,14 +8077,31 @@
             <p:ph type="title"/>
           </p:nvPr>
         </p:nvSpPr>
-        <p:spPr/>
+        <p:spPr>
+          <a:xfrm>
+            <a:off x="766483" y="870832"/>
+            <a:ext cx="11155680" cy="1463040"/>
+          </a:xfrm>
+        </p:spPr>
         <p:txBody>
           <a:bodyPr/>
           <a:lstStyle/>
           <a:p>
             <a:r>
               <a:rPr lang="en-US" dirty="0"/>
-              <a:t>Demo – how &amp; who</a:t>
+              <a:t> </a:t>
+            </a:r>
+            <a:r>
+              <a:rPr lang="en-US" altLang="zh-CN" dirty="0"/>
+              <a:t>demo</a:t>
+            </a:r>
+            <a:r>
+              <a:rPr lang="zh-CN" altLang="en-US" dirty="0"/>
+              <a:t> </a:t>
+            </a:r>
+            <a:r>
+              <a:rPr lang="en-US" dirty="0"/>
+              <a:t>– how &amp; who</a:t>
             </a:r>
           </a:p>
         </p:txBody>
@@ -8347,7 +8299,7 @@
         </p:spPr>
         <p:txBody>
           <a:bodyPr>
-            <a:normAutofit/>
+            <a:normAutofit fontScale="90000"/>
           </a:bodyPr>
           <a:lstStyle/>
           <a:p>
@@ -8355,6 +8307,17 @@
               <a:rPr lang="en-US" dirty="0"/>
               <a:t>LESSONS LEARNED</a:t>
             </a:r>
+            <a:br>
+              <a:rPr lang="en-US" dirty="0"/>
+            </a:br>
+            <a:r>
+              <a:rPr lang="en-GB" dirty="0"/>
+              <a:t>Data governance for Life Sciences must be value-driven, AI-ready, and easy to adopt.</a:t>
+            </a:r>
+            <a:br>
+              <a:rPr lang="en-GB" dirty="0"/>
+            </a:br>
+            <a:endParaRPr lang="en-US" dirty="0"/>
           </a:p>
         </p:txBody>
       </p:sp>
@@ -8439,7 +8402,7 @@
         </p:nvSpPr>
         <p:spPr>
           <a:xfrm>
-            <a:off x="521208" y="1869141"/>
+            <a:off x="516636" y="3079376"/>
             <a:ext cx="11155680" cy="4476795"/>
           </a:xfrm>
         </p:spPr>

</xml_diff>